<commit_message>
Maybe ready for coding
Former-commit-id: 2bef9e2c8ce85776dfba88c0aec9f28560dd5933
</commit_message>
<xml_diff>
--- a/temp/draft.pptx
+++ b/temp/draft.pptx
@@ -6,6 +6,7 @@
   </p:sldMasterIdLst>
   <p:sldIdLst>
     <p:sldId id="257" r:id="rId2"/>
+    <p:sldId id="258" r:id="rId3"/>
   </p:sldIdLst>
   <p:sldSz cx="12192000" cy="6858000"/>
   <p:notesSz cx="6858000" cy="9144000"/>
@@ -3401,6 +3402,36 @@
 </p:sld>
 </file>
 
+<file path=ppt/slides/slide2.xml><?xml version="1.0" encoding="utf-8"?>
+<p:sld xmlns:a="http://schemas.openxmlformats.org/drawingml/2006/main" xmlns:r="http://schemas.openxmlformats.org/officeDocument/2006/relationships" xmlns:p="http://schemas.openxmlformats.org/presentationml/2006/main">
+  <p:cSld>
+    <p:spTree>
+      <p:nvGrpSpPr>
+        <p:cNvPr id="1" name=""/>
+        <p:cNvGrpSpPr/>
+        <p:nvPr/>
+      </p:nvGrpSpPr>
+      <p:grpSpPr>
+        <a:xfrm>
+          <a:off x="0" y="0"/>
+          <a:ext cx="0" cy="0"/>
+          <a:chOff x="0" y="0"/>
+          <a:chExt cx="0" cy="0"/>
+        </a:xfrm>
+      </p:grpSpPr>
+    </p:spTree>
+    <p:extLst>
+      <p:ext uri="{BB962C8B-B14F-4D97-AF65-F5344CB8AC3E}">
+        <p14:creationId xmlns:p14="http://schemas.microsoft.com/office/powerpoint/2010/main" val="3745038738"/>
+      </p:ext>
+    </p:extLst>
+  </p:cSld>
+  <p:clrMapOvr>
+    <a:masterClrMapping/>
+  </p:clrMapOvr>
+</p:sld>
+</file>
+
 <file path=ppt/theme/theme1.xml><?xml version="1.0" encoding="utf-8"?>
 <a:theme xmlns:a="http://schemas.openxmlformats.org/drawingml/2006/main" name="Office Theme">
   <a:themeElements>

</xml_diff>

<commit_message>
Temprory try to add boundary treatment
Former-commit-id: 2a9c330b6e2849e77d933b5be584ad2a374abedc
</commit_message>
<xml_diff>
--- a/temp/draft.pptx
+++ b/temp/draft.pptx
@@ -273,7 +273,7 @@
           <a:p>
             <a:fld id="{8837BD83-C95D-452A-8A03-A9CBA33557B0}" type="datetimeFigureOut">
               <a:rPr lang="en-GB" smtClean="0"/>
-              <a:t>25/12/2021</a:t>
+              <a:t>01/01/2022</a:t>
             </a:fld>
             <a:endParaRPr lang="en-GB"/>
           </a:p>
@@ -473,7 +473,7 @@
           <a:p>
             <a:fld id="{8837BD83-C95D-452A-8A03-A9CBA33557B0}" type="datetimeFigureOut">
               <a:rPr lang="en-GB" smtClean="0"/>
-              <a:t>25/12/2021</a:t>
+              <a:t>01/01/2022</a:t>
             </a:fld>
             <a:endParaRPr lang="en-GB"/>
           </a:p>
@@ -683,7 +683,7 @@
           <a:p>
             <a:fld id="{8837BD83-C95D-452A-8A03-A9CBA33557B0}" type="datetimeFigureOut">
               <a:rPr lang="en-GB" smtClean="0"/>
-              <a:t>25/12/2021</a:t>
+              <a:t>01/01/2022</a:t>
             </a:fld>
             <a:endParaRPr lang="en-GB"/>
           </a:p>
@@ -883,7 +883,7 @@
           <a:p>
             <a:fld id="{8837BD83-C95D-452A-8A03-A9CBA33557B0}" type="datetimeFigureOut">
               <a:rPr lang="en-GB" smtClean="0"/>
-              <a:t>25/12/2021</a:t>
+              <a:t>01/01/2022</a:t>
             </a:fld>
             <a:endParaRPr lang="en-GB"/>
           </a:p>
@@ -1159,7 +1159,7 @@
           <a:p>
             <a:fld id="{8837BD83-C95D-452A-8A03-A9CBA33557B0}" type="datetimeFigureOut">
               <a:rPr lang="en-GB" smtClean="0"/>
-              <a:t>25/12/2021</a:t>
+              <a:t>01/01/2022</a:t>
             </a:fld>
             <a:endParaRPr lang="en-GB"/>
           </a:p>
@@ -1427,7 +1427,7 @@
           <a:p>
             <a:fld id="{8837BD83-C95D-452A-8A03-A9CBA33557B0}" type="datetimeFigureOut">
               <a:rPr lang="en-GB" smtClean="0"/>
-              <a:t>25/12/2021</a:t>
+              <a:t>01/01/2022</a:t>
             </a:fld>
             <a:endParaRPr lang="en-GB"/>
           </a:p>
@@ -1842,7 +1842,7 @@
           <a:p>
             <a:fld id="{8837BD83-C95D-452A-8A03-A9CBA33557B0}" type="datetimeFigureOut">
               <a:rPr lang="en-GB" smtClean="0"/>
-              <a:t>25/12/2021</a:t>
+              <a:t>01/01/2022</a:t>
             </a:fld>
             <a:endParaRPr lang="en-GB"/>
           </a:p>
@@ -1984,7 +1984,7 @@
           <a:p>
             <a:fld id="{8837BD83-C95D-452A-8A03-A9CBA33557B0}" type="datetimeFigureOut">
               <a:rPr lang="en-GB" smtClean="0"/>
-              <a:t>25/12/2021</a:t>
+              <a:t>01/01/2022</a:t>
             </a:fld>
             <a:endParaRPr lang="en-GB"/>
           </a:p>
@@ -2097,7 +2097,7 @@
           <a:p>
             <a:fld id="{8837BD83-C95D-452A-8A03-A9CBA33557B0}" type="datetimeFigureOut">
               <a:rPr lang="en-GB" smtClean="0"/>
-              <a:t>25/12/2021</a:t>
+              <a:t>01/01/2022</a:t>
             </a:fld>
             <a:endParaRPr lang="en-GB"/>
           </a:p>
@@ -2410,7 +2410,7 @@
           <a:p>
             <a:fld id="{8837BD83-C95D-452A-8A03-A9CBA33557B0}" type="datetimeFigureOut">
               <a:rPr lang="en-GB" smtClean="0"/>
-              <a:t>25/12/2021</a:t>
+              <a:t>01/01/2022</a:t>
             </a:fld>
             <a:endParaRPr lang="en-GB"/>
           </a:p>
@@ -2699,7 +2699,7 @@
           <a:p>
             <a:fld id="{8837BD83-C95D-452A-8A03-A9CBA33557B0}" type="datetimeFigureOut">
               <a:rPr lang="en-GB" smtClean="0"/>
-              <a:t>25/12/2021</a:t>
+              <a:t>01/01/2022</a:t>
             </a:fld>
             <a:endParaRPr lang="en-GB"/>
           </a:p>
@@ -2942,7 +2942,7 @@
           <a:p>
             <a:fld id="{8837BD83-C95D-452A-8A03-A9CBA33557B0}" type="datetimeFigureOut">
               <a:rPr lang="en-GB" smtClean="0"/>
-              <a:t>25/12/2021</a:t>
+              <a:t>01/01/2022</a:t>
             </a:fld>
             <a:endParaRPr lang="en-GB"/>
           </a:p>
@@ -3419,6 +3419,1508 @@
           <a:chExt cx="0" cy="0"/>
         </a:xfrm>
       </p:grpSpPr>
+      <p:pic>
+        <p:nvPicPr>
+          <p:cNvPr id="2" name="Picture 1">
+            <a:extLst>
+              <a:ext uri="{FF2B5EF4-FFF2-40B4-BE49-F238E27FC236}">
+                <a16:creationId xmlns:a16="http://schemas.microsoft.com/office/drawing/2014/main" id="{36E5CBD6-A979-479A-9E4E-F5EE837DDBE1}"/>
+              </a:ext>
+            </a:extLst>
+          </p:cNvPr>
+          <p:cNvPicPr>
+            <a:picLocks noChangeAspect="1"/>
+          </p:cNvPicPr>
+          <p:nvPr/>
+        </p:nvPicPr>
+        <p:blipFill>
+          <a:blip r:embed="rId2"/>
+          <a:stretch>
+            <a:fillRect/>
+          </a:stretch>
+        </p:blipFill>
+        <p:spPr>
+          <a:xfrm>
+            <a:off x="1332239" y="546387"/>
+            <a:ext cx="8679023" cy="5496714"/>
+          </a:xfrm>
+          <a:prstGeom prst="rect">
+            <a:avLst/>
+          </a:prstGeom>
+        </p:spPr>
+      </p:pic>
+      <p:sp>
+        <p:nvSpPr>
+          <p:cNvPr id="3" name="Smiley Face 2">
+            <a:extLst>
+              <a:ext uri="{FF2B5EF4-FFF2-40B4-BE49-F238E27FC236}">
+                <a16:creationId xmlns:a16="http://schemas.microsoft.com/office/drawing/2014/main" id="{F18A0263-3220-42E1-BB34-4CEABD55A48A}"/>
+              </a:ext>
+            </a:extLst>
+          </p:cNvPr>
+          <p:cNvSpPr/>
+          <p:nvPr/>
+        </p:nvSpPr>
+        <p:spPr>
+          <a:xfrm>
+            <a:off x="2355638" y="2725034"/>
+            <a:ext cx="157447" cy="151390"/>
+          </a:xfrm>
+          <a:prstGeom prst="smileyFace">
+            <a:avLst/>
+          </a:prstGeom>
+        </p:spPr>
+        <p:style>
+          <a:lnRef idx="2">
+            <a:schemeClr val="accent1">
+              <a:shade val="50000"/>
+            </a:schemeClr>
+          </a:lnRef>
+          <a:fillRef idx="1">
+            <a:schemeClr val="accent1"/>
+          </a:fillRef>
+          <a:effectRef idx="0">
+            <a:schemeClr val="accent1"/>
+          </a:effectRef>
+          <a:fontRef idx="minor">
+            <a:schemeClr val="lt1"/>
+          </a:fontRef>
+        </p:style>
+        <p:txBody>
+          <a:bodyPr rtlCol="0" anchor="ctr"/>
+          <a:lstStyle/>
+          <a:p>
+            <a:pPr algn="ctr"/>
+            <a:endParaRPr lang="en-GB"/>
+          </a:p>
+        </p:txBody>
+      </p:sp>
+      <p:sp>
+        <p:nvSpPr>
+          <p:cNvPr id="4" name="Smiley Face 3">
+            <a:extLst>
+              <a:ext uri="{FF2B5EF4-FFF2-40B4-BE49-F238E27FC236}">
+                <a16:creationId xmlns:a16="http://schemas.microsoft.com/office/drawing/2014/main" id="{2F240A35-7BE0-4EAE-8B93-770E3978F49A}"/>
+              </a:ext>
+            </a:extLst>
+          </p:cNvPr>
+          <p:cNvSpPr/>
+          <p:nvPr/>
+        </p:nvSpPr>
+        <p:spPr>
+          <a:xfrm>
+            <a:off x="2737143" y="2725034"/>
+            <a:ext cx="157447" cy="151390"/>
+          </a:xfrm>
+          <a:prstGeom prst="smileyFace">
+            <a:avLst/>
+          </a:prstGeom>
+        </p:spPr>
+        <p:style>
+          <a:lnRef idx="2">
+            <a:schemeClr val="accent1">
+              <a:shade val="50000"/>
+            </a:schemeClr>
+          </a:lnRef>
+          <a:fillRef idx="1">
+            <a:schemeClr val="accent1"/>
+          </a:fillRef>
+          <a:effectRef idx="0">
+            <a:schemeClr val="accent1"/>
+          </a:effectRef>
+          <a:fontRef idx="minor">
+            <a:schemeClr val="lt1"/>
+          </a:fontRef>
+        </p:style>
+        <p:txBody>
+          <a:bodyPr rtlCol="0" anchor="ctr"/>
+          <a:lstStyle/>
+          <a:p>
+            <a:pPr algn="ctr"/>
+            <a:endParaRPr lang="en-GB"/>
+          </a:p>
+        </p:txBody>
+      </p:sp>
+      <p:sp>
+        <p:nvSpPr>
+          <p:cNvPr id="9" name="Smiley Face 8">
+            <a:extLst>
+              <a:ext uri="{FF2B5EF4-FFF2-40B4-BE49-F238E27FC236}">
+                <a16:creationId xmlns:a16="http://schemas.microsoft.com/office/drawing/2014/main" id="{D9372EE8-316D-4042-9AE9-863BEF380306}"/>
+              </a:ext>
+            </a:extLst>
+          </p:cNvPr>
+          <p:cNvSpPr/>
+          <p:nvPr/>
+        </p:nvSpPr>
+        <p:spPr>
+          <a:xfrm>
+            <a:off x="2961201" y="2649339"/>
+            <a:ext cx="157447" cy="151390"/>
+          </a:xfrm>
+          <a:prstGeom prst="smileyFace">
+            <a:avLst/>
+          </a:prstGeom>
+        </p:spPr>
+        <p:style>
+          <a:lnRef idx="2">
+            <a:schemeClr val="accent1">
+              <a:shade val="50000"/>
+            </a:schemeClr>
+          </a:lnRef>
+          <a:fillRef idx="1">
+            <a:schemeClr val="accent1"/>
+          </a:fillRef>
+          <a:effectRef idx="0">
+            <a:schemeClr val="accent1"/>
+          </a:effectRef>
+          <a:fontRef idx="minor">
+            <a:schemeClr val="lt1"/>
+          </a:fontRef>
+        </p:style>
+        <p:txBody>
+          <a:bodyPr rtlCol="0" anchor="ctr"/>
+          <a:lstStyle/>
+          <a:p>
+            <a:pPr algn="ctr"/>
+            <a:endParaRPr lang="en-GB"/>
+          </a:p>
+        </p:txBody>
+      </p:sp>
+      <p:sp>
+        <p:nvSpPr>
+          <p:cNvPr id="10" name="Smiley Face 9">
+            <a:extLst>
+              <a:ext uri="{FF2B5EF4-FFF2-40B4-BE49-F238E27FC236}">
+                <a16:creationId xmlns:a16="http://schemas.microsoft.com/office/drawing/2014/main" id="{94B68C1F-92E8-4708-9ED0-0AD520CA75DE}"/>
+              </a:ext>
+            </a:extLst>
+          </p:cNvPr>
+          <p:cNvSpPr/>
+          <p:nvPr/>
+        </p:nvSpPr>
+        <p:spPr>
+          <a:xfrm>
+            <a:off x="3518319" y="2376836"/>
+            <a:ext cx="157447" cy="151390"/>
+          </a:xfrm>
+          <a:prstGeom prst="smileyFace">
+            <a:avLst/>
+          </a:prstGeom>
+        </p:spPr>
+        <p:style>
+          <a:lnRef idx="2">
+            <a:schemeClr val="accent1">
+              <a:shade val="50000"/>
+            </a:schemeClr>
+          </a:lnRef>
+          <a:fillRef idx="1">
+            <a:schemeClr val="accent1"/>
+          </a:fillRef>
+          <a:effectRef idx="0">
+            <a:schemeClr val="accent1"/>
+          </a:effectRef>
+          <a:fontRef idx="minor">
+            <a:schemeClr val="lt1"/>
+          </a:fontRef>
+        </p:style>
+        <p:txBody>
+          <a:bodyPr rtlCol="0" anchor="ctr"/>
+          <a:lstStyle/>
+          <a:p>
+            <a:pPr algn="ctr"/>
+            <a:endParaRPr lang="en-GB"/>
+          </a:p>
+        </p:txBody>
+      </p:sp>
+      <p:sp>
+        <p:nvSpPr>
+          <p:cNvPr id="11" name="Smiley Face 10">
+            <a:extLst>
+              <a:ext uri="{FF2B5EF4-FFF2-40B4-BE49-F238E27FC236}">
+                <a16:creationId xmlns:a16="http://schemas.microsoft.com/office/drawing/2014/main" id="{7D6C12D2-45A9-4B1C-9606-C4A264699538}"/>
+              </a:ext>
+            </a:extLst>
+          </p:cNvPr>
+          <p:cNvSpPr/>
+          <p:nvPr/>
+        </p:nvSpPr>
+        <p:spPr>
+          <a:xfrm>
+            <a:off x="3457760" y="2800729"/>
+            <a:ext cx="157447" cy="151390"/>
+          </a:xfrm>
+          <a:prstGeom prst="smileyFace">
+            <a:avLst/>
+          </a:prstGeom>
+        </p:spPr>
+        <p:style>
+          <a:lnRef idx="2">
+            <a:schemeClr val="accent1">
+              <a:shade val="50000"/>
+            </a:schemeClr>
+          </a:lnRef>
+          <a:fillRef idx="1">
+            <a:schemeClr val="accent1"/>
+          </a:fillRef>
+          <a:effectRef idx="0">
+            <a:schemeClr val="accent1"/>
+          </a:effectRef>
+          <a:fontRef idx="minor">
+            <a:schemeClr val="lt1"/>
+          </a:fontRef>
+        </p:style>
+        <p:txBody>
+          <a:bodyPr rtlCol="0" anchor="ctr"/>
+          <a:lstStyle/>
+          <a:p>
+            <a:pPr algn="ctr"/>
+            <a:endParaRPr lang="en-GB"/>
+          </a:p>
+        </p:txBody>
+      </p:sp>
+      <p:sp>
+        <p:nvSpPr>
+          <p:cNvPr id="12" name="Smiley Face 11">
+            <a:extLst>
+              <a:ext uri="{FF2B5EF4-FFF2-40B4-BE49-F238E27FC236}">
+                <a16:creationId xmlns:a16="http://schemas.microsoft.com/office/drawing/2014/main" id="{1AC1298B-0038-4CEA-AEA5-1766C5BD9E98}"/>
+              </a:ext>
+            </a:extLst>
+          </p:cNvPr>
+          <p:cNvSpPr/>
+          <p:nvPr/>
+        </p:nvSpPr>
+        <p:spPr>
+          <a:xfrm>
+            <a:off x="3233702" y="2837063"/>
+            <a:ext cx="157447" cy="151390"/>
+          </a:xfrm>
+          <a:prstGeom prst="smileyFace">
+            <a:avLst/>
+          </a:prstGeom>
+        </p:spPr>
+        <p:style>
+          <a:lnRef idx="2">
+            <a:schemeClr val="accent1">
+              <a:shade val="50000"/>
+            </a:schemeClr>
+          </a:lnRef>
+          <a:fillRef idx="1">
+            <a:schemeClr val="accent1"/>
+          </a:fillRef>
+          <a:effectRef idx="0">
+            <a:schemeClr val="accent1"/>
+          </a:effectRef>
+          <a:fontRef idx="minor">
+            <a:schemeClr val="lt1"/>
+          </a:fontRef>
+        </p:style>
+        <p:txBody>
+          <a:bodyPr rtlCol="0" anchor="ctr"/>
+          <a:lstStyle/>
+          <a:p>
+            <a:pPr algn="ctr"/>
+            <a:endParaRPr lang="en-GB"/>
+          </a:p>
+        </p:txBody>
+      </p:sp>
+      <p:sp>
+        <p:nvSpPr>
+          <p:cNvPr id="13" name="Smiley Face 12">
+            <a:extLst>
+              <a:ext uri="{FF2B5EF4-FFF2-40B4-BE49-F238E27FC236}">
+                <a16:creationId xmlns:a16="http://schemas.microsoft.com/office/drawing/2014/main" id="{F04950DE-3F19-491E-89E2-AF48838F5347}"/>
+              </a:ext>
+            </a:extLst>
+          </p:cNvPr>
+          <p:cNvSpPr/>
+          <p:nvPr/>
+        </p:nvSpPr>
+        <p:spPr>
+          <a:xfrm>
+            <a:off x="3475923" y="3073232"/>
+            <a:ext cx="157447" cy="151390"/>
+          </a:xfrm>
+          <a:prstGeom prst="smileyFace">
+            <a:avLst/>
+          </a:prstGeom>
+        </p:spPr>
+        <p:style>
+          <a:lnRef idx="2">
+            <a:schemeClr val="accent1">
+              <a:shade val="50000"/>
+            </a:schemeClr>
+          </a:lnRef>
+          <a:fillRef idx="1">
+            <a:schemeClr val="accent1"/>
+          </a:fillRef>
+          <a:effectRef idx="0">
+            <a:schemeClr val="accent1"/>
+          </a:effectRef>
+          <a:fontRef idx="minor">
+            <a:schemeClr val="lt1"/>
+          </a:fontRef>
+        </p:style>
+        <p:txBody>
+          <a:bodyPr rtlCol="0" anchor="ctr"/>
+          <a:lstStyle/>
+          <a:p>
+            <a:pPr algn="ctr"/>
+            <a:endParaRPr lang="en-GB"/>
+          </a:p>
+        </p:txBody>
+      </p:sp>
+      <p:sp>
+        <p:nvSpPr>
+          <p:cNvPr id="14" name="Smiley Face 13">
+            <a:extLst>
+              <a:ext uri="{FF2B5EF4-FFF2-40B4-BE49-F238E27FC236}">
+                <a16:creationId xmlns:a16="http://schemas.microsoft.com/office/drawing/2014/main" id="{13A2BF67-D2F5-416B-BA67-6D8BB0911B98}"/>
+              </a:ext>
+            </a:extLst>
+          </p:cNvPr>
+          <p:cNvSpPr/>
+          <p:nvPr/>
+        </p:nvSpPr>
+        <p:spPr>
+          <a:xfrm>
+            <a:off x="2549420" y="2973314"/>
+            <a:ext cx="157447" cy="151390"/>
+          </a:xfrm>
+          <a:prstGeom prst="smileyFace">
+            <a:avLst/>
+          </a:prstGeom>
+        </p:spPr>
+        <p:style>
+          <a:lnRef idx="2">
+            <a:schemeClr val="accent1">
+              <a:shade val="50000"/>
+            </a:schemeClr>
+          </a:lnRef>
+          <a:fillRef idx="1">
+            <a:schemeClr val="accent1"/>
+          </a:fillRef>
+          <a:effectRef idx="0">
+            <a:schemeClr val="accent1"/>
+          </a:effectRef>
+          <a:fontRef idx="minor">
+            <a:schemeClr val="lt1"/>
+          </a:fontRef>
+        </p:style>
+        <p:txBody>
+          <a:bodyPr rtlCol="0" anchor="ctr"/>
+          <a:lstStyle/>
+          <a:p>
+            <a:pPr algn="ctr"/>
+            <a:endParaRPr lang="en-GB"/>
+          </a:p>
+        </p:txBody>
+      </p:sp>
+      <p:sp>
+        <p:nvSpPr>
+          <p:cNvPr id="15" name="Smiley Face 14">
+            <a:extLst>
+              <a:ext uri="{FF2B5EF4-FFF2-40B4-BE49-F238E27FC236}">
+                <a16:creationId xmlns:a16="http://schemas.microsoft.com/office/drawing/2014/main" id="{2A5CB4EB-2F06-4248-8EF0-1DAC46392B6C}"/>
+              </a:ext>
+            </a:extLst>
+          </p:cNvPr>
+          <p:cNvSpPr/>
+          <p:nvPr/>
+        </p:nvSpPr>
+        <p:spPr>
+          <a:xfrm>
+            <a:off x="3288200" y="3321512"/>
+            <a:ext cx="157447" cy="151390"/>
+          </a:xfrm>
+          <a:prstGeom prst="smileyFace">
+            <a:avLst/>
+          </a:prstGeom>
+        </p:spPr>
+        <p:style>
+          <a:lnRef idx="2">
+            <a:schemeClr val="accent1">
+              <a:shade val="50000"/>
+            </a:schemeClr>
+          </a:lnRef>
+          <a:fillRef idx="1">
+            <a:schemeClr val="accent1"/>
+          </a:fillRef>
+          <a:effectRef idx="0">
+            <a:schemeClr val="accent1"/>
+          </a:effectRef>
+          <a:fontRef idx="minor">
+            <a:schemeClr val="lt1"/>
+          </a:fontRef>
+        </p:style>
+        <p:txBody>
+          <a:bodyPr rtlCol="0" anchor="ctr"/>
+          <a:lstStyle/>
+          <a:p>
+            <a:pPr algn="ctr"/>
+            <a:endParaRPr lang="en-GB"/>
+          </a:p>
+        </p:txBody>
+      </p:sp>
+      <p:sp>
+        <p:nvSpPr>
+          <p:cNvPr id="16" name="Smiley Face 15">
+            <a:extLst>
+              <a:ext uri="{FF2B5EF4-FFF2-40B4-BE49-F238E27FC236}">
+                <a16:creationId xmlns:a16="http://schemas.microsoft.com/office/drawing/2014/main" id="{AB208338-A2BF-4724-A1A6-BD136BD777D7}"/>
+              </a:ext>
+            </a:extLst>
+          </p:cNvPr>
+          <p:cNvSpPr/>
+          <p:nvPr/>
+        </p:nvSpPr>
+        <p:spPr>
+          <a:xfrm>
+            <a:off x="2997531" y="3294744"/>
+            <a:ext cx="157447" cy="151390"/>
+          </a:xfrm>
+          <a:prstGeom prst="smileyFace">
+            <a:avLst/>
+          </a:prstGeom>
+        </p:spPr>
+        <p:style>
+          <a:lnRef idx="2">
+            <a:schemeClr val="accent1">
+              <a:shade val="50000"/>
+            </a:schemeClr>
+          </a:lnRef>
+          <a:fillRef idx="1">
+            <a:schemeClr val="accent1"/>
+          </a:fillRef>
+          <a:effectRef idx="0">
+            <a:schemeClr val="accent1"/>
+          </a:effectRef>
+          <a:fontRef idx="minor">
+            <a:schemeClr val="lt1"/>
+          </a:fontRef>
+        </p:style>
+        <p:txBody>
+          <a:bodyPr rtlCol="0" anchor="ctr"/>
+          <a:lstStyle/>
+          <a:p>
+            <a:pPr algn="ctr"/>
+            <a:endParaRPr lang="en-GB"/>
+          </a:p>
+        </p:txBody>
+      </p:sp>
+      <p:sp>
+        <p:nvSpPr>
+          <p:cNvPr id="17" name="Smiley Face 16">
+            <a:extLst>
+              <a:ext uri="{FF2B5EF4-FFF2-40B4-BE49-F238E27FC236}">
+                <a16:creationId xmlns:a16="http://schemas.microsoft.com/office/drawing/2014/main" id="{167A2C8D-1C88-415B-BE98-48D4536B9A4C}"/>
+              </a:ext>
+            </a:extLst>
+          </p:cNvPr>
+          <p:cNvSpPr/>
+          <p:nvPr/>
+        </p:nvSpPr>
+        <p:spPr>
+          <a:xfrm>
+            <a:off x="2694750" y="3268526"/>
+            <a:ext cx="157447" cy="151390"/>
+          </a:xfrm>
+          <a:prstGeom prst="smileyFace">
+            <a:avLst/>
+          </a:prstGeom>
+        </p:spPr>
+        <p:style>
+          <a:lnRef idx="2">
+            <a:schemeClr val="accent1">
+              <a:shade val="50000"/>
+            </a:schemeClr>
+          </a:lnRef>
+          <a:fillRef idx="1">
+            <a:schemeClr val="accent1"/>
+          </a:fillRef>
+          <a:effectRef idx="0">
+            <a:schemeClr val="accent1"/>
+          </a:effectRef>
+          <a:fontRef idx="minor">
+            <a:schemeClr val="lt1"/>
+          </a:fontRef>
+        </p:style>
+        <p:txBody>
+          <a:bodyPr rtlCol="0" anchor="ctr"/>
+          <a:lstStyle/>
+          <a:p>
+            <a:pPr algn="ctr"/>
+            <a:endParaRPr lang="en-GB"/>
+          </a:p>
+        </p:txBody>
+      </p:sp>
+      <p:sp>
+        <p:nvSpPr>
+          <p:cNvPr id="18" name="Smiley Face 17">
+            <a:extLst>
+              <a:ext uri="{FF2B5EF4-FFF2-40B4-BE49-F238E27FC236}">
+                <a16:creationId xmlns:a16="http://schemas.microsoft.com/office/drawing/2014/main" id="{A435241E-E34C-4379-B75D-613F1C6CE99C}"/>
+              </a:ext>
+            </a:extLst>
+          </p:cNvPr>
+          <p:cNvSpPr/>
+          <p:nvPr/>
+        </p:nvSpPr>
+        <p:spPr>
+          <a:xfrm>
+            <a:off x="2379852" y="3224622"/>
+            <a:ext cx="157447" cy="151390"/>
+          </a:xfrm>
+          <a:prstGeom prst="smileyFace">
+            <a:avLst/>
+          </a:prstGeom>
+        </p:spPr>
+        <p:style>
+          <a:lnRef idx="2">
+            <a:schemeClr val="accent1">
+              <a:shade val="50000"/>
+            </a:schemeClr>
+          </a:lnRef>
+          <a:fillRef idx="1">
+            <a:schemeClr val="accent1"/>
+          </a:fillRef>
+          <a:effectRef idx="0">
+            <a:schemeClr val="accent1"/>
+          </a:effectRef>
+          <a:fontRef idx="minor">
+            <a:schemeClr val="lt1"/>
+          </a:fontRef>
+        </p:style>
+        <p:txBody>
+          <a:bodyPr rtlCol="0" anchor="ctr"/>
+          <a:lstStyle/>
+          <a:p>
+            <a:pPr algn="ctr"/>
+            <a:endParaRPr lang="en-GB"/>
+          </a:p>
+        </p:txBody>
+      </p:sp>
+      <p:sp>
+        <p:nvSpPr>
+          <p:cNvPr id="19" name="Smiley Face 18">
+            <a:extLst>
+              <a:ext uri="{FF2B5EF4-FFF2-40B4-BE49-F238E27FC236}">
+                <a16:creationId xmlns:a16="http://schemas.microsoft.com/office/drawing/2014/main" id="{BDCD70F9-B968-4BFD-A28A-981B069DDFB8}"/>
+              </a:ext>
+            </a:extLst>
+          </p:cNvPr>
+          <p:cNvSpPr/>
+          <p:nvPr/>
+        </p:nvSpPr>
+        <p:spPr>
+          <a:xfrm>
+            <a:off x="3115614" y="3450676"/>
+            <a:ext cx="157447" cy="151390"/>
+          </a:xfrm>
+          <a:prstGeom prst="smileyFace">
+            <a:avLst/>
+          </a:prstGeom>
+        </p:spPr>
+        <p:style>
+          <a:lnRef idx="2">
+            <a:schemeClr val="accent1">
+              <a:shade val="50000"/>
+            </a:schemeClr>
+          </a:lnRef>
+          <a:fillRef idx="1">
+            <a:schemeClr val="accent1"/>
+          </a:fillRef>
+          <a:effectRef idx="0">
+            <a:schemeClr val="accent1"/>
+          </a:effectRef>
+          <a:fontRef idx="minor">
+            <a:schemeClr val="lt1"/>
+          </a:fontRef>
+        </p:style>
+        <p:txBody>
+          <a:bodyPr rtlCol="0" anchor="ctr"/>
+          <a:lstStyle/>
+          <a:p>
+            <a:pPr algn="ctr"/>
+            <a:endParaRPr lang="en-GB"/>
+          </a:p>
+        </p:txBody>
+      </p:sp>
+      <p:sp>
+        <p:nvSpPr>
+          <p:cNvPr id="20" name="Smiley Face 19">
+            <a:extLst>
+              <a:ext uri="{FF2B5EF4-FFF2-40B4-BE49-F238E27FC236}">
+                <a16:creationId xmlns:a16="http://schemas.microsoft.com/office/drawing/2014/main" id="{B511EB94-DC90-467C-8129-D301617E8C38}"/>
+              </a:ext>
+            </a:extLst>
+          </p:cNvPr>
+          <p:cNvSpPr/>
+          <p:nvPr/>
+        </p:nvSpPr>
+        <p:spPr>
+          <a:xfrm>
+            <a:off x="2531243" y="3563738"/>
+            <a:ext cx="157447" cy="151390"/>
+          </a:xfrm>
+          <a:prstGeom prst="smileyFace">
+            <a:avLst/>
+          </a:prstGeom>
+        </p:spPr>
+        <p:style>
+          <a:lnRef idx="2">
+            <a:schemeClr val="accent1">
+              <a:shade val="50000"/>
+            </a:schemeClr>
+          </a:lnRef>
+          <a:fillRef idx="1">
+            <a:schemeClr val="accent1"/>
+          </a:fillRef>
+          <a:effectRef idx="0">
+            <a:schemeClr val="accent1"/>
+          </a:effectRef>
+          <a:fontRef idx="minor">
+            <a:schemeClr val="lt1"/>
+          </a:fontRef>
+        </p:style>
+        <p:txBody>
+          <a:bodyPr rtlCol="0" anchor="ctr"/>
+          <a:lstStyle/>
+          <a:p>
+            <a:pPr algn="ctr"/>
+            <a:endParaRPr lang="en-GB"/>
+          </a:p>
+        </p:txBody>
+      </p:sp>
+      <p:sp>
+        <p:nvSpPr>
+          <p:cNvPr id="21" name="Smiley Face 20">
+            <a:extLst>
+              <a:ext uri="{FF2B5EF4-FFF2-40B4-BE49-F238E27FC236}">
+                <a16:creationId xmlns:a16="http://schemas.microsoft.com/office/drawing/2014/main" id="{311332DB-03C7-4B36-A477-F028455EF295}"/>
+              </a:ext>
+            </a:extLst>
+          </p:cNvPr>
+          <p:cNvSpPr/>
+          <p:nvPr/>
+        </p:nvSpPr>
+        <p:spPr>
+          <a:xfrm>
+            <a:off x="2708371" y="3726206"/>
+            <a:ext cx="157447" cy="151390"/>
+          </a:xfrm>
+          <a:prstGeom prst="smileyFace">
+            <a:avLst/>
+          </a:prstGeom>
+        </p:spPr>
+        <p:style>
+          <a:lnRef idx="2">
+            <a:schemeClr val="accent1">
+              <a:shade val="50000"/>
+            </a:schemeClr>
+          </a:lnRef>
+          <a:fillRef idx="1">
+            <a:schemeClr val="accent1"/>
+          </a:fillRef>
+          <a:effectRef idx="0">
+            <a:schemeClr val="accent1"/>
+          </a:effectRef>
+          <a:fontRef idx="minor">
+            <a:schemeClr val="lt1"/>
+          </a:fontRef>
+        </p:style>
+        <p:txBody>
+          <a:bodyPr rtlCol="0" anchor="ctr"/>
+          <a:lstStyle/>
+          <a:p>
+            <a:pPr algn="ctr"/>
+            <a:endParaRPr lang="en-GB"/>
+          </a:p>
+        </p:txBody>
+      </p:sp>
+      <p:sp>
+        <p:nvSpPr>
+          <p:cNvPr id="22" name="Smiley Face 21">
+            <a:extLst>
+              <a:ext uri="{FF2B5EF4-FFF2-40B4-BE49-F238E27FC236}">
+                <a16:creationId xmlns:a16="http://schemas.microsoft.com/office/drawing/2014/main" id="{49502F2A-AE27-4FEE-B744-2A604B80F136}"/>
+              </a:ext>
+            </a:extLst>
+          </p:cNvPr>
+          <p:cNvSpPr/>
+          <p:nvPr/>
+        </p:nvSpPr>
+        <p:spPr>
+          <a:xfrm>
+            <a:off x="2349577" y="3849312"/>
+            <a:ext cx="157447" cy="151390"/>
+          </a:xfrm>
+          <a:prstGeom prst="smileyFace">
+            <a:avLst/>
+          </a:prstGeom>
+        </p:spPr>
+        <p:style>
+          <a:lnRef idx="2">
+            <a:schemeClr val="accent1">
+              <a:shade val="50000"/>
+            </a:schemeClr>
+          </a:lnRef>
+          <a:fillRef idx="1">
+            <a:schemeClr val="accent1"/>
+          </a:fillRef>
+          <a:effectRef idx="0">
+            <a:schemeClr val="accent1"/>
+          </a:effectRef>
+          <a:fontRef idx="minor">
+            <a:schemeClr val="lt1"/>
+          </a:fontRef>
+        </p:style>
+        <p:txBody>
+          <a:bodyPr rtlCol="0" anchor="ctr"/>
+          <a:lstStyle/>
+          <a:p>
+            <a:pPr algn="ctr"/>
+            <a:endParaRPr lang="en-GB"/>
+          </a:p>
+        </p:txBody>
+      </p:sp>
+      <p:sp>
+        <p:nvSpPr>
+          <p:cNvPr id="23" name="Smiley Face 22">
+            <a:extLst>
+              <a:ext uri="{FF2B5EF4-FFF2-40B4-BE49-F238E27FC236}">
+                <a16:creationId xmlns:a16="http://schemas.microsoft.com/office/drawing/2014/main" id="{F0789288-EA5F-47B4-A5C7-4DCFE628A022}"/>
+              </a:ext>
+            </a:extLst>
+          </p:cNvPr>
+          <p:cNvSpPr/>
+          <p:nvPr/>
+        </p:nvSpPr>
+        <p:spPr>
+          <a:xfrm>
+            <a:off x="2815866" y="3956869"/>
+            <a:ext cx="157447" cy="151390"/>
+          </a:xfrm>
+          <a:prstGeom prst="smileyFace">
+            <a:avLst/>
+          </a:prstGeom>
+        </p:spPr>
+        <p:style>
+          <a:lnRef idx="2">
+            <a:schemeClr val="accent1">
+              <a:shade val="50000"/>
+            </a:schemeClr>
+          </a:lnRef>
+          <a:fillRef idx="1">
+            <a:schemeClr val="accent1"/>
+          </a:fillRef>
+          <a:effectRef idx="0">
+            <a:schemeClr val="accent1"/>
+          </a:effectRef>
+          <a:fontRef idx="minor">
+            <a:schemeClr val="lt1"/>
+          </a:fontRef>
+        </p:style>
+        <p:txBody>
+          <a:bodyPr rtlCol="0" anchor="ctr"/>
+          <a:lstStyle/>
+          <a:p>
+            <a:pPr algn="ctr"/>
+            <a:endParaRPr lang="en-GB"/>
+          </a:p>
+        </p:txBody>
+      </p:sp>
+      <p:sp>
+        <p:nvSpPr>
+          <p:cNvPr id="24" name="Smiley Face 23">
+            <a:extLst>
+              <a:ext uri="{FF2B5EF4-FFF2-40B4-BE49-F238E27FC236}">
+                <a16:creationId xmlns:a16="http://schemas.microsoft.com/office/drawing/2014/main" id="{50F63D6E-F671-45AF-8B1B-B27CA8933C6B}"/>
+              </a:ext>
+            </a:extLst>
+          </p:cNvPr>
+          <p:cNvSpPr/>
+          <p:nvPr/>
+        </p:nvSpPr>
+        <p:spPr>
+          <a:xfrm>
+            <a:off x="2997531" y="3849312"/>
+            <a:ext cx="157447" cy="151390"/>
+          </a:xfrm>
+          <a:prstGeom prst="smileyFace">
+            <a:avLst/>
+          </a:prstGeom>
+        </p:spPr>
+        <p:style>
+          <a:lnRef idx="2">
+            <a:schemeClr val="accent1">
+              <a:shade val="50000"/>
+            </a:schemeClr>
+          </a:lnRef>
+          <a:fillRef idx="1">
+            <a:schemeClr val="accent1"/>
+          </a:fillRef>
+          <a:effectRef idx="0">
+            <a:schemeClr val="accent1"/>
+          </a:effectRef>
+          <a:fontRef idx="minor">
+            <a:schemeClr val="lt1"/>
+          </a:fontRef>
+        </p:style>
+        <p:txBody>
+          <a:bodyPr rtlCol="0" anchor="ctr"/>
+          <a:lstStyle/>
+          <a:p>
+            <a:pPr algn="ctr"/>
+            <a:endParaRPr lang="en-GB"/>
+          </a:p>
+        </p:txBody>
+      </p:sp>
+      <p:sp>
+        <p:nvSpPr>
+          <p:cNvPr id="25" name="Smiley Face 24">
+            <a:extLst>
+              <a:ext uri="{FF2B5EF4-FFF2-40B4-BE49-F238E27FC236}">
+                <a16:creationId xmlns:a16="http://schemas.microsoft.com/office/drawing/2014/main" id="{51CC21D0-763E-4BFE-91BB-5F273165E34B}"/>
+              </a:ext>
+            </a:extLst>
+          </p:cNvPr>
+          <p:cNvSpPr/>
+          <p:nvPr/>
+        </p:nvSpPr>
+        <p:spPr>
+          <a:xfrm>
+            <a:off x="3475923" y="3788204"/>
+            <a:ext cx="157447" cy="151390"/>
+          </a:xfrm>
+          <a:prstGeom prst="smileyFace">
+            <a:avLst/>
+          </a:prstGeom>
+        </p:spPr>
+        <p:style>
+          <a:lnRef idx="2">
+            <a:schemeClr val="accent1">
+              <a:shade val="50000"/>
+            </a:schemeClr>
+          </a:lnRef>
+          <a:fillRef idx="1">
+            <a:schemeClr val="accent1"/>
+          </a:fillRef>
+          <a:effectRef idx="0">
+            <a:schemeClr val="accent1"/>
+          </a:effectRef>
+          <a:fontRef idx="minor">
+            <a:schemeClr val="lt1"/>
+          </a:fontRef>
+        </p:style>
+        <p:txBody>
+          <a:bodyPr rtlCol="0" anchor="ctr"/>
+          <a:lstStyle/>
+          <a:p>
+            <a:pPr algn="ctr"/>
+            <a:endParaRPr lang="en-GB"/>
+          </a:p>
+        </p:txBody>
+      </p:sp>
+      <p:sp>
+        <p:nvSpPr>
+          <p:cNvPr id="26" name="Smiley Face 25">
+            <a:extLst>
+              <a:ext uri="{FF2B5EF4-FFF2-40B4-BE49-F238E27FC236}">
+                <a16:creationId xmlns:a16="http://schemas.microsoft.com/office/drawing/2014/main" id="{32B5DBD9-B5AA-4641-8878-8DFB90AA2CB5}"/>
+              </a:ext>
+            </a:extLst>
+          </p:cNvPr>
+          <p:cNvSpPr/>
+          <p:nvPr/>
+        </p:nvSpPr>
+        <p:spPr>
+          <a:xfrm>
+            <a:off x="3765081" y="3824055"/>
+            <a:ext cx="157447" cy="151390"/>
+          </a:xfrm>
+          <a:prstGeom prst="smileyFace">
+            <a:avLst/>
+          </a:prstGeom>
+        </p:spPr>
+        <p:style>
+          <a:lnRef idx="2">
+            <a:schemeClr val="accent1">
+              <a:shade val="50000"/>
+            </a:schemeClr>
+          </a:lnRef>
+          <a:fillRef idx="1">
+            <a:schemeClr val="accent1"/>
+          </a:fillRef>
+          <a:effectRef idx="0">
+            <a:schemeClr val="accent1"/>
+          </a:effectRef>
+          <a:fontRef idx="minor">
+            <a:schemeClr val="lt1"/>
+          </a:fontRef>
+        </p:style>
+        <p:txBody>
+          <a:bodyPr rtlCol="0" anchor="ctr"/>
+          <a:lstStyle/>
+          <a:p>
+            <a:pPr algn="ctr"/>
+            <a:endParaRPr lang="en-GB"/>
+          </a:p>
+        </p:txBody>
+      </p:sp>
+      <p:sp>
+        <p:nvSpPr>
+          <p:cNvPr id="27" name="Smiley Face 26">
+            <a:extLst>
+              <a:ext uri="{FF2B5EF4-FFF2-40B4-BE49-F238E27FC236}">
+                <a16:creationId xmlns:a16="http://schemas.microsoft.com/office/drawing/2014/main" id="{79BCA03D-0CAD-4FEC-A25B-4E3288E262E2}"/>
+              </a:ext>
+            </a:extLst>
+          </p:cNvPr>
+          <p:cNvSpPr/>
+          <p:nvPr/>
+        </p:nvSpPr>
+        <p:spPr>
+          <a:xfrm>
+            <a:off x="3044457" y="4195238"/>
+            <a:ext cx="157447" cy="151390"/>
+          </a:xfrm>
+          <a:prstGeom prst="smileyFace">
+            <a:avLst/>
+          </a:prstGeom>
+        </p:spPr>
+        <p:style>
+          <a:lnRef idx="2">
+            <a:schemeClr val="accent1">
+              <a:shade val="50000"/>
+            </a:schemeClr>
+          </a:lnRef>
+          <a:fillRef idx="1">
+            <a:schemeClr val="accent1"/>
+          </a:fillRef>
+          <a:effectRef idx="0">
+            <a:schemeClr val="accent1"/>
+          </a:effectRef>
+          <a:fontRef idx="minor">
+            <a:schemeClr val="lt1"/>
+          </a:fontRef>
+        </p:style>
+        <p:txBody>
+          <a:bodyPr rtlCol="0" anchor="ctr"/>
+          <a:lstStyle/>
+          <a:p>
+            <a:pPr algn="ctr"/>
+            <a:endParaRPr lang="en-GB"/>
+          </a:p>
+        </p:txBody>
+      </p:sp>
+      <p:sp>
+        <p:nvSpPr>
+          <p:cNvPr id="28" name="Smiley Face 27">
+            <a:extLst>
+              <a:ext uri="{FF2B5EF4-FFF2-40B4-BE49-F238E27FC236}">
+                <a16:creationId xmlns:a16="http://schemas.microsoft.com/office/drawing/2014/main" id="{AE2EB6BC-1890-45E1-8FCD-C1F3DFB8B077}"/>
+              </a:ext>
+            </a:extLst>
+          </p:cNvPr>
+          <p:cNvSpPr/>
+          <p:nvPr/>
+        </p:nvSpPr>
+        <p:spPr>
+          <a:xfrm>
+            <a:off x="2316260" y="4173078"/>
+            <a:ext cx="157447" cy="151390"/>
+          </a:xfrm>
+          <a:prstGeom prst="smileyFace">
+            <a:avLst/>
+          </a:prstGeom>
+        </p:spPr>
+        <p:style>
+          <a:lnRef idx="2">
+            <a:schemeClr val="accent1">
+              <a:shade val="50000"/>
+            </a:schemeClr>
+          </a:lnRef>
+          <a:fillRef idx="1">
+            <a:schemeClr val="accent1"/>
+          </a:fillRef>
+          <a:effectRef idx="0">
+            <a:schemeClr val="accent1"/>
+          </a:effectRef>
+          <a:fontRef idx="minor">
+            <a:schemeClr val="lt1"/>
+          </a:fontRef>
+        </p:style>
+        <p:txBody>
+          <a:bodyPr rtlCol="0" anchor="ctr"/>
+          <a:lstStyle/>
+          <a:p>
+            <a:pPr algn="ctr"/>
+            <a:endParaRPr lang="en-GB"/>
+          </a:p>
+        </p:txBody>
+      </p:sp>
+      <p:sp>
+        <p:nvSpPr>
+          <p:cNvPr id="29" name="Smiley Face 28">
+            <a:extLst>
+              <a:ext uri="{FF2B5EF4-FFF2-40B4-BE49-F238E27FC236}">
+                <a16:creationId xmlns:a16="http://schemas.microsoft.com/office/drawing/2014/main" id="{A09D8565-1EA1-4B35-8769-CA6C408F136F}"/>
+              </a:ext>
+            </a:extLst>
+          </p:cNvPr>
+          <p:cNvSpPr/>
+          <p:nvPr/>
+        </p:nvSpPr>
+        <p:spPr>
+          <a:xfrm>
+            <a:off x="2316259" y="4543220"/>
+            <a:ext cx="157447" cy="151390"/>
+          </a:xfrm>
+          <a:prstGeom prst="smileyFace">
+            <a:avLst/>
+          </a:prstGeom>
+        </p:spPr>
+        <p:style>
+          <a:lnRef idx="2">
+            <a:schemeClr val="accent1">
+              <a:shade val="50000"/>
+            </a:schemeClr>
+          </a:lnRef>
+          <a:fillRef idx="1">
+            <a:schemeClr val="accent1"/>
+          </a:fillRef>
+          <a:effectRef idx="0">
+            <a:schemeClr val="accent1"/>
+          </a:effectRef>
+          <a:fontRef idx="minor">
+            <a:schemeClr val="lt1"/>
+          </a:fontRef>
+        </p:style>
+        <p:txBody>
+          <a:bodyPr rtlCol="0" anchor="ctr"/>
+          <a:lstStyle/>
+          <a:p>
+            <a:pPr algn="ctr"/>
+            <a:endParaRPr lang="en-GB"/>
+          </a:p>
+        </p:txBody>
+      </p:sp>
+      <p:sp>
+        <p:nvSpPr>
+          <p:cNvPr id="30" name="Smiley Face 29">
+            <a:extLst>
+              <a:ext uri="{FF2B5EF4-FFF2-40B4-BE49-F238E27FC236}">
+                <a16:creationId xmlns:a16="http://schemas.microsoft.com/office/drawing/2014/main" id="{461C1743-55EC-443C-8517-AF08ABAEF980}"/>
+              </a:ext>
+            </a:extLst>
+          </p:cNvPr>
+          <p:cNvSpPr/>
+          <p:nvPr/>
+        </p:nvSpPr>
+        <p:spPr>
+          <a:xfrm>
+            <a:off x="2809800" y="4351278"/>
+            <a:ext cx="157447" cy="151390"/>
+          </a:xfrm>
+          <a:prstGeom prst="smileyFace">
+            <a:avLst/>
+          </a:prstGeom>
+        </p:spPr>
+        <p:style>
+          <a:lnRef idx="2">
+            <a:schemeClr val="accent1">
+              <a:shade val="50000"/>
+            </a:schemeClr>
+          </a:lnRef>
+          <a:fillRef idx="1">
+            <a:schemeClr val="accent1"/>
+          </a:fillRef>
+          <a:effectRef idx="0">
+            <a:schemeClr val="accent1"/>
+          </a:effectRef>
+          <a:fontRef idx="minor">
+            <a:schemeClr val="lt1"/>
+          </a:fontRef>
+        </p:style>
+        <p:txBody>
+          <a:bodyPr rtlCol="0" anchor="ctr"/>
+          <a:lstStyle/>
+          <a:p>
+            <a:pPr algn="ctr"/>
+            <a:endParaRPr lang="en-GB"/>
+          </a:p>
+        </p:txBody>
+      </p:sp>
+      <p:sp>
+        <p:nvSpPr>
+          <p:cNvPr id="31" name="Smiley Face 30">
+            <a:extLst>
+              <a:ext uri="{FF2B5EF4-FFF2-40B4-BE49-F238E27FC236}">
+                <a16:creationId xmlns:a16="http://schemas.microsoft.com/office/drawing/2014/main" id="{C0F0AC58-5979-4CA7-BFCC-DFEBEF1A677A}"/>
+              </a:ext>
+            </a:extLst>
+          </p:cNvPr>
+          <p:cNvSpPr/>
+          <p:nvPr/>
+        </p:nvSpPr>
+        <p:spPr>
+          <a:xfrm>
+            <a:off x="2809800" y="4568761"/>
+            <a:ext cx="157447" cy="151390"/>
+          </a:xfrm>
+          <a:prstGeom prst="smileyFace">
+            <a:avLst/>
+          </a:prstGeom>
+        </p:spPr>
+        <p:style>
+          <a:lnRef idx="2">
+            <a:schemeClr val="accent1">
+              <a:shade val="50000"/>
+            </a:schemeClr>
+          </a:lnRef>
+          <a:fillRef idx="1">
+            <a:schemeClr val="accent1"/>
+          </a:fillRef>
+          <a:effectRef idx="0">
+            <a:schemeClr val="accent1"/>
+          </a:effectRef>
+          <a:fontRef idx="minor">
+            <a:schemeClr val="lt1"/>
+          </a:fontRef>
+        </p:style>
+        <p:txBody>
+          <a:bodyPr rtlCol="0" anchor="ctr"/>
+          <a:lstStyle/>
+          <a:p>
+            <a:pPr algn="ctr"/>
+            <a:endParaRPr lang="en-GB"/>
+          </a:p>
+        </p:txBody>
+      </p:sp>
+      <p:sp>
+        <p:nvSpPr>
+          <p:cNvPr id="32" name="Smiley Face 31">
+            <a:extLst>
+              <a:ext uri="{FF2B5EF4-FFF2-40B4-BE49-F238E27FC236}">
+                <a16:creationId xmlns:a16="http://schemas.microsoft.com/office/drawing/2014/main" id="{1A0BCAAF-9CD3-4A34-9FFF-00AB0F040332}"/>
+              </a:ext>
+            </a:extLst>
+          </p:cNvPr>
+          <p:cNvSpPr/>
+          <p:nvPr/>
+        </p:nvSpPr>
+        <p:spPr>
+          <a:xfrm>
+            <a:off x="2809800" y="4824960"/>
+            <a:ext cx="157447" cy="151390"/>
+          </a:xfrm>
+          <a:prstGeom prst="smileyFace">
+            <a:avLst/>
+          </a:prstGeom>
+        </p:spPr>
+        <p:style>
+          <a:lnRef idx="2">
+            <a:schemeClr val="accent1">
+              <a:shade val="50000"/>
+            </a:schemeClr>
+          </a:lnRef>
+          <a:fillRef idx="1">
+            <a:schemeClr val="accent1"/>
+          </a:fillRef>
+          <a:effectRef idx="0">
+            <a:schemeClr val="accent1"/>
+          </a:effectRef>
+          <a:fontRef idx="minor">
+            <a:schemeClr val="lt1"/>
+          </a:fontRef>
+        </p:style>
+        <p:txBody>
+          <a:bodyPr rtlCol="0" anchor="ctr"/>
+          <a:lstStyle/>
+          <a:p>
+            <a:pPr algn="ctr"/>
+            <a:endParaRPr lang="en-GB"/>
+          </a:p>
+        </p:txBody>
+      </p:sp>
+      <p:sp>
+        <p:nvSpPr>
+          <p:cNvPr id="33" name="Smiley Face 32">
+            <a:extLst>
+              <a:ext uri="{FF2B5EF4-FFF2-40B4-BE49-F238E27FC236}">
+                <a16:creationId xmlns:a16="http://schemas.microsoft.com/office/drawing/2014/main" id="{CFF4732D-ADFF-4493-A309-F6D8A4602EA7}"/>
+              </a:ext>
+            </a:extLst>
+          </p:cNvPr>
+          <p:cNvSpPr/>
+          <p:nvPr/>
+        </p:nvSpPr>
+        <p:spPr>
+          <a:xfrm>
+            <a:off x="2429805" y="5004350"/>
+            <a:ext cx="157447" cy="151390"/>
+          </a:xfrm>
+          <a:prstGeom prst="smileyFace">
+            <a:avLst/>
+          </a:prstGeom>
+        </p:spPr>
+        <p:style>
+          <a:lnRef idx="2">
+            <a:schemeClr val="accent1">
+              <a:shade val="50000"/>
+            </a:schemeClr>
+          </a:lnRef>
+          <a:fillRef idx="1">
+            <a:schemeClr val="accent1"/>
+          </a:fillRef>
+          <a:effectRef idx="0">
+            <a:schemeClr val="accent1"/>
+          </a:effectRef>
+          <a:fontRef idx="minor">
+            <a:schemeClr val="lt1"/>
+          </a:fontRef>
+        </p:style>
+        <p:txBody>
+          <a:bodyPr rtlCol="0" anchor="ctr"/>
+          <a:lstStyle/>
+          <a:p>
+            <a:pPr algn="ctr"/>
+            <a:endParaRPr lang="en-GB"/>
+          </a:p>
+        </p:txBody>
+      </p:sp>
+      <p:sp>
+        <p:nvSpPr>
+          <p:cNvPr id="34" name="Smiley Face 33">
+            <a:extLst>
+              <a:ext uri="{FF2B5EF4-FFF2-40B4-BE49-F238E27FC236}">
+                <a16:creationId xmlns:a16="http://schemas.microsoft.com/office/drawing/2014/main" id="{08F3E6BD-906B-43DA-9F30-B7B0BE01E8FF}"/>
+              </a:ext>
+            </a:extLst>
+          </p:cNvPr>
+          <p:cNvSpPr/>
+          <p:nvPr/>
+        </p:nvSpPr>
+        <p:spPr>
+          <a:xfrm>
+            <a:off x="3123180" y="4886265"/>
+            <a:ext cx="157447" cy="151390"/>
+          </a:xfrm>
+          <a:prstGeom prst="smileyFace">
+            <a:avLst/>
+          </a:prstGeom>
+        </p:spPr>
+        <p:style>
+          <a:lnRef idx="2">
+            <a:schemeClr val="accent1">
+              <a:shade val="50000"/>
+            </a:schemeClr>
+          </a:lnRef>
+          <a:fillRef idx="1">
+            <a:schemeClr val="accent1"/>
+          </a:fillRef>
+          <a:effectRef idx="0">
+            <a:schemeClr val="accent1"/>
+          </a:effectRef>
+          <a:fontRef idx="minor">
+            <a:schemeClr val="lt1"/>
+          </a:fontRef>
+        </p:style>
+        <p:txBody>
+          <a:bodyPr rtlCol="0" anchor="ctr"/>
+          <a:lstStyle/>
+          <a:p>
+            <a:pPr algn="ctr"/>
+            <a:endParaRPr lang="en-GB"/>
+          </a:p>
+        </p:txBody>
+      </p:sp>
+      <p:sp>
+        <p:nvSpPr>
+          <p:cNvPr id="35" name="Smiley Face 34">
+            <a:extLst>
+              <a:ext uri="{FF2B5EF4-FFF2-40B4-BE49-F238E27FC236}">
+                <a16:creationId xmlns:a16="http://schemas.microsoft.com/office/drawing/2014/main" id="{67871007-41BE-44F2-BEE9-3D28FB84B2D7}"/>
+              </a:ext>
+            </a:extLst>
+          </p:cNvPr>
+          <p:cNvSpPr/>
+          <p:nvPr/>
+        </p:nvSpPr>
+        <p:spPr>
+          <a:xfrm>
+            <a:off x="3366923" y="4764262"/>
+            <a:ext cx="157447" cy="151390"/>
+          </a:xfrm>
+          <a:prstGeom prst="smileyFace">
+            <a:avLst/>
+          </a:prstGeom>
+        </p:spPr>
+        <p:style>
+          <a:lnRef idx="2">
+            <a:schemeClr val="accent1">
+              <a:shade val="50000"/>
+            </a:schemeClr>
+          </a:lnRef>
+          <a:fillRef idx="1">
+            <a:schemeClr val="accent1"/>
+          </a:fillRef>
+          <a:effectRef idx="0">
+            <a:schemeClr val="accent1"/>
+          </a:effectRef>
+          <a:fontRef idx="minor">
+            <a:schemeClr val="lt1"/>
+          </a:fontRef>
+        </p:style>
+        <p:txBody>
+          <a:bodyPr rtlCol="0" anchor="ctr"/>
+          <a:lstStyle/>
+          <a:p>
+            <a:pPr algn="ctr"/>
+            <a:endParaRPr lang="en-GB"/>
+          </a:p>
+        </p:txBody>
+      </p:sp>
+      <p:sp>
+        <p:nvSpPr>
+          <p:cNvPr id="36" name="Smiley Face 35">
+            <a:extLst>
+              <a:ext uri="{FF2B5EF4-FFF2-40B4-BE49-F238E27FC236}">
+                <a16:creationId xmlns:a16="http://schemas.microsoft.com/office/drawing/2014/main" id="{2E4E7907-7A30-4FDF-A607-9D54A92FE7FF}"/>
+              </a:ext>
+            </a:extLst>
+          </p:cNvPr>
+          <p:cNvSpPr/>
+          <p:nvPr/>
+        </p:nvSpPr>
+        <p:spPr>
+          <a:xfrm>
+            <a:off x="3597042" y="4568761"/>
+            <a:ext cx="157447" cy="151390"/>
+          </a:xfrm>
+          <a:prstGeom prst="smileyFace">
+            <a:avLst/>
+          </a:prstGeom>
+        </p:spPr>
+        <p:style>
+          <a:lnRef idx="2">
+            <a:schemeClr val="accent1">
+              <a:shade val="50000"/>
+            </a:schemeClr>
+          </a:lnRef>
+          <a:fillRef idx="1">
+            <a:schemeClr val="accent1"/>
+          </a:fillRef>
+          <a:effectRef idx="0">
+            <a:schemeClr val="accent1"/>
+          </a:effectRef>
+          <a:fontRef idx="minor">
+            <a:schemeClr val="lt1"/>
+          </a:fontRef>
+        </p:style>
+        <p:txBody>
+          <a:bodyPr rtlCol="0" anchor="ctr"/>
+          <a:lstStyle/>
+          <a:p>
+            <a:pPr algn="ctr"/>
+            <a:endParaRPr lang="en-GB"/>
+          </a:p>
+        </p:txBody>
+      </p:sp>
+      <p:sp>
+        <p:nvSpPr>
+          <p:cNvPr id="37" name="Smiley Face 36">
+            <a:extLst>
+              <a:ext uri="{FF2B5EF4-FFF2-40B4-BE49-F238E27FC236}">
+                <a16:creationId xmlns:a16="http://schemas.microsoft.com/office/drawing/2014/main" id="{9B3792A2-E80F-4D90-BC9A-8611C5F7172E}"/>
+              </a:ext>
+            </a:extLst>
+          </p:cNvPr>
+          <p:cNvSpPr/>
+          <p:nvPr/>
+        </p:nvSpPr>
+        <p:spPr>
+          <a:xfrm>
+            <a:off x="3421421" y="4324468"/>
+            <a:ext cx="157447" cy="151390"/>
+          </a:xfrm>
+          <a:prstGeom prst="smileyFace">
+            <a:avLst/>
+          </a:prstGeom>
+        </p:spPr>
+        <p:style>
+          <a:lnRef idx="2">
+            <a:schemeClr val="accent1">
+              <a:shade val="50000"/>
+            </a:schemeClr>
+          </a:lnRef>
+          <a:fillRef idx="1">
+            <a:schemeClr val="accent1"/>
+          </a:fillRef>
+          <a:effectRef idx="0">
+            <a:schemeClr val="accent1"/>
+          </a:effectRef>
+          <a:fontRef idx="minor">
+            <a:schemeClr val="lt1"/>
+          </a:fontRef>
+        </p:style>
+        <p:txBody>
+          <a:bodyPr rtlCol="0" anchor="ctr"/>
+          <a:lstStyle/>
+          <a:p>
+            <a:pPr algn="ctr"/>
+            <a:endParaRPr lang="en-GB"/>
+          </a:p>
+        </p:txBody>
+      </p:sp>
+      <p:sp>
+        <p:nvSpPr>
+          <p:cNvPr id="38" name="Smiley Face 37">
+            <a:extLst>
+              <a:ext uri="{FF2B5EF4-FFF2-40B4-BE49-F238E27FC236}">
+                <a16:creationId xmlns:a16="http://schemas.microsoft.com/office/drawing/2014/main" id="{C044910F-F08A-4F44-9FFE-9F0F4215A9ED}"/>
+              </a:ext>
+            </a:extLst>
+          </p:cNvPr>
+          <p:cNvSpPr/>
+          <p:nvPr/>
+        </p:nvSpPr>
+        <p:spPr>
+          <a:xfrm>
+            <a:off x="3578868" y="4908218"/>
+            <a:ext cx="157447" cy="151390"/>
+          </a:xfrm>
+          <a:prstGeom prst="smileyFace">
+            <a:avLst/>
+          </a:prstGeom>
+        </p:spPr>
+        <p:style>
+          <a:lnRef idx="2">
+            <a:schemeClr val="accent1">
+              <a:shade val="50000"/>
+            </a:schemeClr>
+          </a:lnRef>
+          <a:fillRef idx="1">
+            <a:schemeClr val="accent1"/>
+          </a:fillRef>
+          <a:effectRef idx="0">
+            <a:schemeClr val="accent1"/>
+          </a:effectRef>
+          <a:fontRef idx="minor">
+            <a:schemeClr val="lt1"/>
+          </a:fontRef>
+        </p:style>
+        <p:txBody>
+          <a:bodyPr rtlCol="0" anchor="ctr"/>
+          <a:lstStyle/>
+          <a:p>
+            <a:pPr algn="ctr"/>
+            <a:endParaRPr lang="en-GB"/>
+          </a:p>
+        </p:txBody>
+      </p:sp>
     </p:spTree>
     <p:extLst>
       <p:ext uri="{BB962C8B-B14F-4D97-AF65-F5344CB8AC3E}">

</xml_diff>